<commit_message>
Force sync all files to GitHub (manual sync for deployment)
</commit_message>
<xml_diff>
--- a/static/startscreen.pptx
+++ b/static/startscreen.pptx
@@ -107,6 +107,11 @@
       </a:defRPr>
     </a:lvl9pPr>
   </p:defaultTextStyle>
+  <p:extLst>
+    <p:ext uri="{EFAFB233-063F-42B5-8137-9DF3F51BA10A}">
+      <p15:sldGuideLst xmlns:p15="http://schemas.microsoft.com/office/powerpoint/2012/main"/>
+    </p:ext>
+  </p:extLst>
 </p:presentation>
 </file>
 
@@ -257,7 +262,7 @@
           <a:p>
             <a:fld id="{8AFC3D36-F7D8-B142-A9A2-75F8339346E4}" type="datetimeFigureOut">
               <a:rPr lang="en-US" smtClean="0"/>
-              <a:t>4/24/25</a:t>
+              <a:t>5/25/25</a:t>
             </a:fld>
             <a:endParaRPr lang="en-US"/>
           </a:p>
@@ -455,7 +460,7 @@
           <a:p>
             <a:fld id="{8AFC3D36-F7D8-B142-A9A2-75F8339346E4}" type="datetimeFigureOut">
               <a:rPr lang="en-US" smtClean="0"/>
-              <a:t>4/24/25</a:t>
+              <a:t>5/25/25</a:t>
             </a:fld>
             <a:endParaRPr lang="en-US"/>
           </a:p>
@@ -663,7 +668,7 @@
           <a:p>
             <a:fld id="{8AFC3D36-F7D8-B142-A9A2-75F8339346E4}" type="datetimeFigureOut">
               <a:rPr lang="en-US" smtClean="0"/>
-              <a:t>4/24/25</a:t>
+              <a:t>5/25/25</a:t>
             </a:fld>
             <a:endParaRPr lang="en-US"/>
           </a:p>
@@ -861,7 +866,7 @@
           <a:p>
             <a:fld id="{8AFC3D36-F7D8-B142-A9A2-75F8339346E4}" type="datetimeFigureOut">
               <a:rPr lang="en-US" smtClean="0"/>
-              <a:t>4/24/25</a:t>
+              <a:t>5/25/25</a:t>
             </a:fld>
             <a:endParaRPr lang="en-US"/>
           </a:p>
@@ -1136,7 +1141,7 @@
           <a:p>
             <a:fld id="{8AFC3D36-F7D8-B142-A9A2-75F8339346E4}" type="datetimeFigureOut">
               <a:rPr lang="en-US" smtClean="0"/>
-              <a:t>4/24/25</a:t>
+              <a:t>5/25/25</a:t>
             </a:fld>
             <a:endParaRPr lang="en-US"/>
           </a:p>
@@ -1401,7 +1406,7 @@
           <a:p>
             <a:fld id="{8AFC3D36-F7D8-B142-A9A2-75F8339346E4}" type="datetimeFigureOut">
               <a:rPr lang="en-US" smtClean="0"/>
-              <a:t>4/24/25</a:t>
+              <a:t>5/25/25</a:t>
             </a:fld>
             <a:endParaRPr lang="en-US"/>
           </a:p>
@@ -1813,7 +1818,7 @@
           <a:p>
             <a:fld id="{8AFC3D36-F7D8-B142-A9A2-75F8339346E4}" type="datetimeFigureOut">
               <a:rPr lang="en-US" smtClean="0"/>
-              <a:t>4/24/25</a:t>
+              <a:t>5/25/25</a:t>
             </a:fld>
             <a:endParaRPr lang="en-US"/>
           </a:p>
@@ -1954,7 +1959,7 @@
           <a:p>
             <a:fld id="{8AFC3D36-F7D8-B142-A9A2-75F8339346E4}" type="datetimeFigureOut">
               <a:rPr lang="en-US" smtClean="0"/>
-              <a:t>4/24/25</a:t>
+              <a:t>5/25/25</a:t>
             </a:fld>
             <a:endParaRPr lang="en-US"/>
           </a:p>
@@ -2067,7 +2072,7 @@
           <a:p>
             <a:fld id="{8AFC3D36-F7D8-B142-A9A2-75F8339346E4}" type="datetimeFigureOut">
               <a:rPr lang="en-US" smtClean="0"/>
-              <a:t>4/24/25</a:t>
+              <a:t>5/25/25</a:t>
             </a:fld>
             <a:endParaRPr lang="en-US"/>
           </a:p>
@@ -2378,7 +2383,7 @@
           <a:p>
             <a:fld id="{8AFC3D36-F7D8-B142-A9A2-75F8339346E4}" type="datetimeFigureOut">
               <a:rPr lang="en-US" smtClean="0"/>
-              <a:t>4/24/25</a:t>
+              <a:t>5/25/25</a:t>
             </a:fld>
             <a:endParaRPr lang="en-US"/>
           </a:p>
@@ -2666,7 +2671,7 @@
           <a:p>
             <a:fld id="{8AFC3D36-F7D8-B142-A9A2-75F8339346E4}" type="datetimeFigureOut">
               <a:rPr lang="en-US" smtClean="0"/>
-              <a:t>4/24/25</a:t>
+              <a:t>5/25/25</a:t>
             </a:fld>
             <a:endParaRPr lang="en-US"/>
           </a:p>
@@ -2907,7 +2912,7 @@
           <a:p>
             <a:fld id="{8AFC3D36-F7D8-B142-A9A2-75F8339346E4}" type="datetimeFigureOut">
               <a:rPr lang="en-US" smtClean="0"/>
-              <a:t>4/24/25</a:t>
+              <a:t>5/25/25</a:t>
             </a:fld>
             <a:endParaRPr lang="en-US"/>
           </a:p>
@@ -3559,7 +3564,7 @@
             <a:p>
               <a:r>
                 <a:rPr lang="en-US" dirty="0"/>
-                <a:t>Press ANY key to start!</a:t>
+                <a:t>Press Play to start!</a:t>
               </a:r>
             </a:p>
           </p:txBody>

</xml_diff>